<commit_message>
Update mobile exam slides
</commit_message>
<xml_diff>
--- a/Mobile/Exam Preparation/Exam Preparation.pptx
+++ b/Mobile/Exam Preparation/Exam Preparation.pptx
@@ -5,7 +5,7 @@
     <p:sldMasterId id="2147483648" r:id="rId1"/>
   </p:sldMasterIdLst>
   <p:notesMasterIdLst>
-    <p:notesMasterId r:id="rId9"/>
+    <p:notesMasterId r:id="rId10"/>
   </p:notesMasterIdLst>
   <p:sldIdLst>
     <p:sldId id="256" r:id="rId2"/>
@@ -15,6 +15,7 @@
     <p:sldId id="297" r:id="rId6"/>
     <p:sldId id="298" r:id="rId7"/>
     <p:sldId id="299" r:id="rId8"/>
+    <p:sldId id="300" r:id="rId9"/>
   </p:sldIdLst>
   <p:sldSz cx="12192000" cy="6858000"/>
   <p:notesSz cx="6858000" cy="9144000"/>
@@ -214,7 +215,7 @@
           <a:p>
             <a:fld id="{5C15C721-1CBE-9B49-BE99-3A9DF18FA391}" type="datetimeFigureOut">
               <a:rPr lang="en-US" smtClean="0"/>
-              <a:t>6/11/19</a:t>
+              <a:t>6/18/19</a:t>
             </a:fld>
             <a:endParaRPr lang="en-US"/>
           </a:p>
@@ -596,7 +597,6 @@
               <a:rPr lang="en-US" dirty="0" smtClean="0"/>
               <a:t>Mobile assignment</a:t>
             </a:r>
-            <a:endParaRPr lang="en-US" dirty="0" smtClean="0"/>
           </a:p>
         </p:txBody>
       </p:sp>
@@ -1164,6 +1164,94 @@
 </p:notes>
 </file>
 
+<file path=ppt/notesSlides/notesSlide8.xml><?xml version="1.0" encoding="utf-8"?>
+<p:notes xmlns:a="http://schemas.openxmlformats.org/drawingml/2006/main" xmlns:r="http://schemas.openxmlformats.org/officeDocument/2006/relationships" xmlns:p="http://schemas.openxmlformats.org/presentationml/2006/main">
+  <p:cSld>
+    <p:spTree>
+      <p:nvGrpSpPr>
+        <p:cNvPr id="1" name=""/>
+        <p:cNvGrpSpPr/>
+        <p:nvPr/>
+      </p:nvGrpSpPr>
+      <p:grpSpPr>
+        <a:xfrm>
+          <a:off x="0" y="0"/>
+          <a:ext cx="0" cy="0"/>
+          <a:chOff x="0" y="0"/>
+          <a:chExt cx="0" cy="0"/>
+        </a:xfrm>
+      </p:grpSpPr>
+      <p:sp>
+        <p:nvSpPr>
+          <p:cNvPr id="2" name="Slide Image Placeholder 1"/>
+          <p:cNvSpPr>
+            <a:spLocks noGrp="1" noRot="1" noChangeAspect="1"/>
+          </p:cNvSpPr>
+          <p:nvPr>
+            <p:ph type="sldImg"/>
+          </p:nvPr>
+        </p:nvSpPr>
+        <p:spPr/>
+      </p:sp>
+      <p:sp>
+        <p:nvSpPr>
+          <p:cNvPr id="3" name="Notes Placeholder 2"/>
+          <p:cNvSpPr>
+            <a:spLocks noGrp="1"/>
+          </p:cNvSpPr>
+          <p:nvPr>
+            <p:ph type="body" idx="1"/>
+          </p:nvPr>
+        </p:nvSpPr>
+        <p:spPr/>
+        <p:txBody>
+          <a:bodyPr/>
+          <a:lstStyle/>
+          <a:p>
+            <a:pPr marL="171450" indent="-171450">
+              <a:buFont typeface="Arial" charset="0"/>
+              <a:buChar char="•"/>
+            </a:pPr>
+            <a:endParaRPr lang="en-US" baseline="0" dirty="0" smtClean="0"/>
+          </a:p>
+        </p:txBody>
+      </p:sp>
+      <p:sp>
+        <p:nvSpPr>
+          <p:cNvPr id="4" name="Slide Number Placeholder 3"/>
+          <p:cNvSpPr>
+            <a:spLocks noGrp="1"/>
+          </p:cNvSpPr>
+          <p:nvPr>
+            <p:ph type="sldNum" sz="quarter" idx="10"/>
+          </p:nvPr>
+        </p:nvSpPr>
+        <p:spPr/>
+        <p:txBody>
+          <a:bodyPr/>
+          <a:lstStyle/>
+          <a:p>
+            <a:fld id="{5C949890-84D1-B346-997E-B43A2CF20212}" type="slidenum">
+              <a:rPr lang="en-US" smtClean="0"/>
+              <a:t>8</a:t>
+            </a:fld>
+            <a:endParaRPr lang="en-US"/>
+          </a:p>
+        </p:txBody>
+      </p:sp>
+    </p:spTree>
+    <p:extLst>
+      <p:ext uri="{BB962C8B-B14F-4D97-AF65-F5344CB8AC3E}">
+        <p14:creationId xmlns:p14="http://schemas.microsoft.com/office/powerpoint/2010/main" val="1250935417"/>
+      </p:ext>
+    </p:extLst>
+  </p:cSld>
+  <p:clrMapOvr>
+    <a:masterClrMapping/>
+  </p:clrMapOvr>
+</p:notes>
+</file>
+
 <file path=ppt/slideLayouts/slideLayout1.xml><?xml version="1.0" encoding="utf-8"?>
 <p:sldLayout xmlns:a="http://schemas.openxmlformats.org/drawingml/2006/main" xmlns:r="http://schemas.openxmlformats.org/officeDocument/2006/relationships" xmlns:p="http://schemas.openxmlformats.org/presentationml/2006/main" type="title" preserve="1">
   <p:cSld name="Title Slide">
@@ -1295,7 +1383,7 @@
           <a:p>
             <a:fld id="{BD4CA122-8521-6D44-9B67-558DC60F8753}" type="datetimeFigureOut">
               <a:rPr lang="en-US" smtClean="0"/>
-              <a:t>6/11/19</a:t>
+              <a:t>6/18/19</a:t>
             </a:fld>
             <a:endParaRPr lang="en-US"/>
           </a:p>
@@ -1465,7 +1553,7 @@
           <a:p>
             <a:fld id="{BD4CA122-8521-6D44-9B67-558DC60F8753}" type="datetimeFigureOut">
               <a:rPr lang="en-US" smtClean="0"/>
-              <a:t>6/11/19</a:t>
+              <a:t>6/18/19</a:t>
             </a:fld>
             <a:endParaRPr lang="en-US"/>
           </a:p>
@@ -1645,7 +1733,7 @@
           <a:p>
             <a:fld id="{BD4CA122-8521-6D44-9B67-558DC60F8753}" type="datetimeFigureOut">
               <a:rPr lang="en-US" smtClean="0"/>
-              <a:t>6/11/19</a:t>
+              <a:t>6/18/19</a:t>
             </a:fld>
             <a:endParaRPr lang="en-US"/>
           </a:p>
@@ -1815,7 +1903,7 @@
           <a:p>
             <a:fld id="{BD4CA122-8521-6D44-9B67-558DC60F8753}" type="datetimeFigureOut">
               <a:rPr lang="en-US" smtClean="0"/>
-              <a:t>6/11/19</a:t>
+              <a:t>6/18/19</a:t>
             </a:fld>
             <a:endParaRPr lang="en-US"/>
           </a:p>
@@ -2061,7 +2149,7 @@
           <a:p>
             <a:fld id="{BD4CA122-8521-6D44-9B67-558DC60F8753}" type="datetimeFigureOut">
               <a:rPr lang="en-US" smtClean="0"/>
-              <a:t>6/11/19</a:t>
+              <a:t>6/18/19</a:t>
             </a:fld>
             <a:endParaRPr lang="en-US"/>
           </a:p>
@@ -2293,7 +2381,7 @@
           <a:p>
             <a:fld id="{BD4CA122-8521-6D44-9B67-558DC60F8753}" type="datetimeFigureOut">
               <a:rPr lang="en-US" smtClean="0"/>
-              <a:t>6/11/19</a:t>
+              <a:t>6/18/19</a:t>
             </a:fld>
             <a:endParaRPr lang="en-US"/>
           </a:p>
@@ -2660,7 +2748,7 @@
           <a:p>
             <a:fld id="{BD4CA122-8521-6D44-9B67-558DC60F8753}" type="datetimeFigureOut">
               <a:rPr lang="en-US" smtClean="0"/>
-              <a:t>6/11/19</a:t>
+              <a:t>6/18/19</a:t>
             </a:fld>
             <a:endParaRPr lang="en-US"/>
           </a:p>
@@ -2778,7 +2866,7 @@
           <a:p>
             <a:fld id="{BD4CA122-8521-6D44-9B67-558DC60F8753}" type="datetimeFigureOut">
               <a:rPr lang="en-US" smtClean="0"/>
-              <a:t>6/11/19</a:t>
+              <a:t>6/18/19</a:t>
             </a:fld>
             <a:endParaRPr lang="en-US"/>
           </a:p>
@@ -2873,7 +2961,7 @@
           <a:p>
             <a:fld id="{BD4CA122-8521-6D44-9B67-558DC60F8753}" type="datetimeFigureOut">
               <a:rPr lang="en-US" smtClean="0"/>
-              <a:t>6/11/19</a:t>
+              <a:t>6/18/19</a:t>
             </a:fld>
             <a:endParaRPr lang="en-US"/>
           </a:p>
@@ -3150,7 +3238,7 @@
           <a:p>
             <a:fld id="{BD4CA122-8521-6D44-9B67-558DC60F8753}" type="datetimeFigureOut">
               <a:rPr lang="en-US" smtClean="0"/>
-              <a:t>6/11/19</a:t>
+              <a:t>6/18/19</a:t>
             </a:fld>
             <a:endParaRPr lang="en-US"/>
           </a:p>
@@ -3403,7 +3491,7 @@
           <a:p>
             <a:fld id="{BD4CA122-8521-6D44-9B67-558DC60F8753}" type="datetimeFigureOut">
               <a:rPr lang="en-US" smtClean="0"/>
-              <a:t>6/11/19</a:t>
+              <a:t>6/18/19</a:t>
             </a:fld>
             <a:endParaRPr lang="en-US"/>
           </a:p>
@@ -3616,7 +3704,7 @@
           <a:p>
             <a:fld id="{BD4CA122-8521-6D44-9B67-558DC60F8753}" type="datetimeFigureOut">
               <a:rPr lang="en-US" smtClean="0"/>
-              <a:t>6/11/19</a:t>
+              <a:t>6/18/19</a:t>
             </a:fld>
             <a:endParaRPr lang="en-US"/>
           </a:p>
@@ -4198,7 +4286,6 @@
               <a:rPr lang="en-US" sz="3800" b="1" dirty="0" smtClean="0"/>
               <a:t>Android lifecycle</a:t>
             </a:r>
-            <a:endParaRPr lang="en-US" sz="3800" b="1" dirty="0" smtClean="0"/>
           </a:p>
           <a:p>
             <a:endParaRPr lang="en-US" sz="3800" b="1" dirty="0"/>
@@ -4282,7 +4369,6 @@
               <a:rPr lang="en-US" sz="2000" dirty="0" smtClean="0"/>
               <a:t>onDestroy()</a:t>
             </a:r>
-            <a:endParaRPr lang="en-US" sz="2000" dirty="0" smtClean="0"/>
           </a:p>
         </p:txBody>
       </p:sp>
@@ -4387,7 +4473,6 @@
               <a:rPr lang="en-US" sz="3800" b="1" dirty="0" smtClean="0"/>
               <a:t>Persistent data</a:t>
             </a:r>
-            <a:endParaRPr lang="en-US" sz="3800" b="1" dirty="0" smtClean="0"/>
           </a:p>
           <a:p>
             <a:endParaRPr lang="en-US" sz="3800" b="1" dirty="0"/>
@@ -4518,7 +4603,6 @@
               <a:rPr lang="en-US" sz="3800" b="1" dirty="0" smtClean="0"/>
               <a:t>Intents</a:t>
             </a:r>
-            <a:endParaRPr lang="en-US" sz="3800" b="1" dirty="0" smtClean="0"/>
           </a:p>
           <a:p>
             <a:endParaRPr lang="en-US" sz="3800" b="1" dirty="0"/>
@@ -4644,7 +4728,6 @@
               <a:rPr lang="en-US" sz="3800" b="1" dirty="0" smtClean="0"/>
               <a:t>Usability testing</a:t>
             </a:r>
-            <a:endParaRPr lang="en-US" sz="3800" b="1" dirty="0" smtClean="0"/>
           </a:p>
           <a:p>
             <a:pPr marL="1485900" lvl="2" indent="-571500">
@@ -4826,13 +4909,8 @@
             </a:r>
             <a:r>
               <a:rPr lang="en-US" sz="3800" b="1" dirty="0" smtClean="0"/>
-              <a:t>Mobile a</a:t>
-            </a:r>
-            <a:r>
-              <a:rPr lang="en-US" sz="3800" b="1" dirty="0" smtClean="0"/>
-              <a:t>ssignment </a:t>
-            </a:r>
-            <a:endParaRPr lang="en-US" sz="3800" b="1" dirty="0" smtClean="0"/>
+              <a:t>Mobile assignment </a:t>
+            </a:r>
           </a:p>
           <a:p>
             <a:pPr lvl="2"/>
@@ -4962,7 +5040,6 @@
               <a:rPr lang="en-US" sz="3800" b="1" dirty="0" smtClean="0"/>
               <a:t>Scenario questions</a:t>
             </a:r>
-            <a:endParaRPr lang="en-US" sz="3800" b="1" dirty="0" smtClean="0"/>
           </a:p>
           <a:p>
             <a:pPr lvl="2"/>
@@ -4991,11 +5068,7 @@
             </a:r>
             <a:r>
               <a:rPr lang="en-GB" sz="2500" dirty="0"/>
-              <a:t>how you go about getting your app to achieve this effect, paying attention to data coming from the camera.</a:t>
-            </a:r>
-            <a:r>
-              <a:rPr lang="en-GB" sz="2500" dirty="0"/>
-              <a:t> </a:t>
+              <a:t>how you go about getting your app to achieve this effect, paying attention to data coming from the camera. </a:t>
             </a:r>
           </a:p>
         </p:txBody>
@@ -5004,6 +5077,144 @@
     <p:extLst>
       <p:ext uri="{BB962C8B-B14F-4D97-AF65-F5344CB8AC3E}">
         <p14:creationId xmlns:p14="http://schemas.microsoft.com/office/powerpoint/2010/main" val="908214859"/>
+      </p:ext>
+    </p:extLst>
+  </p:cSld>
+  <p:clrMapOvr>
+    <a:masterClrMapping/>
+  </p:clrMapOvr>
+  <p:timing>
+    <p:tnLst>
+      <p:par>
+        <p:cTn id="1" dur="indefinite" restart="never" nodeType="tmRoot"/>
+      </p:par>
+    </p:tnLst>
+  </p:timing>
+</p:sld>
+</file>
+
+<file path=ppt/slides/slide8.xml><?xml version="1.0" encoding="utf-8"?>
+<p:sld xmlns:a="http://schemas.openxmlformats.org/drawingml/2006/main" xmlns:r="http://schemas.openxmlformats.org/officeDocument/2006/relationships" xmlns:p="http://schemas.openxmlformats.org/presentationml/2006/main">
+  <p:cSld>
+    <p:bg>
+      <p:bgPr>
+        <a:solidFill>
+          <a:schemeClr val="accent5">
+            <a:lumMod val="60000"/>
+            <a:lumOff val="40000"/>
+          </a:schemeClr>
+        </a:solidFill>
+        <a:effectLst/>
+      </p:bgPr>
+    </p:bg>
+    <p:spTree>
+      <p:nvGrpSpPr>
+        <p:cNvPr id="1" name=""/>
+        <p:cNvGrpSpPr/>
+        <p:nvPr/>
+      </p:nvGrpSpPr>
+      <p:grpSpPr>
+        <a:xfrm>
+          <a:off x="0" y="0"/>
+          <a:ext cx="0" cy="0"/>
+          <a:chOff x="0" y="0"/>
+          <a:chExt cx="0" cy="0"/>
+        </a:xfrm>
+      </p:grpSpPr>
+      <p:sp>
+        <p:nvSpPr>
+          <p:cNvPr id="9" name="Slide Number Placeholder 8"/>
+          <p:cNvSpPr>
+            <a:spLocks noGrp="1"/>
+          </p:cNvSpPr>
+          <p:nvPr>
+            <p:ph type="sldNum" sz="quarter" idx="12"/>
+          </p:nvPr>
+        </p:nvSpPr>
+        <p:spPr/>
+        <p:txBody>
+          <a:bodyPr/>
+          <a:lstStyle/>
+          <a:p>
+            <a:fld id="{B822FDE6-25CA-0444-94EE-C6FC8C5EFEB8}" type="slidenum">
+              <a:rPr lang="en-US" smtClean="0"/>
+              <a:t>8</a:t>
+            </a:fld>
+            <a:endParaRPr lang="en-US"/>
+          </a:p>
+        </p:txBody>
+      </p:sp>
+      <p:sp>
+        <p:nvSpPr>
+          <p:cNvPr id="6" name="Rectangle 5"/>
+          <p:cNvSpPr/>
+          <p:nvPr/>
+        </p:nvSpPr>
+        <p:spPr>
+          <a:xfrm>
+            <a:off x="0" y="1299607"/>
+            <a:ext cx="12192000" cy="2031325"/>
+          </a:xfrm>
+          <a:prstGeom prst="rect">
+            <a:avLst/>
+          </a:prstGeom>
+          <a:noFill/>
+        </p:spPr>
+        <p:txBody>
+          <a:bodyPr wrap="square" lIns="91440" tIns="45720" rIns="91440" bIns="45720">
+            <a:spAutoFit/>
+          </a:bodyPr>
+          <a:lstStyle/>
+          <a:p>
+            <a:r>
+              <a:rPr lang="en-US" sz="3800" dirty="0" smtClean="0"/>
+              <a:t>	</a:t>
+            </a:r>
+            <a:r>
+              <a:rPr lang="en-US" sz="3800" b="1" dirty="0" smtClean="0"/>
+              <a:t>Other questions</a:t>
+            </a:r>
+            <a:endParaRPr lang="en-US" sz="3800" b="1" dirty="0" smtClean="0"/>
+          </a:p>
+          <a:p>
+            <a:pPr lvl="2"/>
+            <a:endParaRPr lang="en-GB" sz="3800" dirty="0" smtClean="0"/>
+          </a:p>
+          <a:p>
+            <a:pPr marL="1371600" lvl="2" indent="-457200">
+              <a:buFont typeface="Arial" charset="0"/>
+              <a:buChar char="•"/>
+            </a:pPr>
+            <a:r>
+              <a:rPr lang="en-GB" sz="2500" dirty="0"/>
+              <a:t>How does the activity respond when the user rotates the screen?</a:t>
+            </a:r>
+          </a:p>
+          <a:p>
+            <a:pPr marL="1371600" lvl="2" indent="-457200">
+              <a:buFont typeface="Arial" charset="0"/>
+              <a:buChar char="•"/>
+            </a:pPr>
+            <a:r>
+              <a:rPr lang="en-AU" sz="2500" dirty="0"/>
+              <a:t>In the Android system</a:t>
+            </a:r>
+            <a:r>
+              <a:rPr lang="en-GB" sz="2500" dirty="0"/>
+              <a:t>, what is the resource folder and what is it used for?</a:t>
+            </a:r>
+            <a:r>
+              <a:rPr lang="en-GB" sz="2500" dirty="0"/>
+              <a:t> </a:t>
+            </a:r>
+            <a:endParaRPr lang="en-GB" sz="2500" dirty="0"/>
+          </a:p>
+        </p:txBody>
+      </p:sp>
+    </p:spTree>
+    <p:extLst>
+      <p:ext uri="{BB962C8B-B14F-4D97-AF65-F5344CB8AC3E}">
+        <p14:creationId xmlns:p14="http://schemas.microsoft.com/office/powerpoint/2010/main" val="1679269413"/>
       </p:ext>
     </p:extLst>
   </p:cSld>

</xml_diff>